<commit_message>
Improved exception handling for template and output file operations.
</commit_message>
<xml_diff>
--- a/ChangeQueryExport/unifiedactiontracker-Technical Feedback-12-19-2023-Export.pptx
+++ b/ChangeQueryExport/unifiedactiontracker-Technical Feedback-12-19-2023-Export.pptx
@@ -1,12 +1,11 @@
 
 <file path=ppt/presentation.xml><?xml version="1.0" encoding="utf-8"?>
-<p:presentation xmlns:p15="http://schemas.microsoft.com/office/powerpoint/2012/main" xmlns:a="http://schemas.openxmlformats.org/drawingml/2006/main" xmlns:r="http://schemas.openxmlformats.org/officeDocument/2006/relationships" xmlns:p="http://schemas.openxmlformats.org/presentationml/2006/main" saveSubsetFonts="1">
+<p:presentation xmlns:a="http://schemas.openxmlformats.org/drawingml/2006/main" xmlns:r="http://schemas.openxmlformats.org/officeDocument/2006/relationships" xmlns:p="http://schemas.openxmlformats.org/presentationml/2006/main" saveSubsetFonts="1">
   <p:sldMasterIdLst>
     <p:sldMasterId id="2147483648" r:id="rId1"/>
   </p:sldMasterIdLst>
   <p:sldIdLst>
     <p:sldId id="256" r:id="rId2"/>
-    <p:sldId id="258" r:id="R0e34d47079a84dcb"/>
     <p:sldId id="257" r:id="rId3"/>
   </p:sldIdLst>
   <p:sldSz cx="12192000" cy="6858000"/>
@@ -198,7 +197,7 @@
 </file>
 
 <file path=ppt/slideLayouts/slideLayout1.xml><?xml version="1.0" encoding="utf-8"?>
-<p:sldLayout xmlns:a16="http://schemas.microsoft.com/office/drawing/2014/main" xmlns:p14="http://schemas.microsoft.com/office/powerpoint/2010/main" xmlns:a="http://schemas.openxmlformats.org/drawingml/2006/main" xmlns:r="http://schemas.openxmlformats.org/officeDocument/2006/relationships" xmlns:p="http://schemas.openxmlformats.org/presentationml/2006/main" preserve="1" userDrawn="1">
+<p:sldLayout xmlns:a="http://schemas.openxmlformats.org/drawingml/2006/main" xmlns:r="http://schemas.openxmlformats.org/officeDocument/2006/relationships" xmlns:p="http://schemas.openxmlformats.org/presentationml/2006/main" preserve="1" userDrawn="1">
   <p:cSld name="Title">
     <p:spTree>
       <p:nvGrpSpPr>
@@ -541,7 +540,7 @@
 </file>
 
 <file path=ppt/slideLayouts/slideLayout2.xml><?xml version="1.0" encoding="utf-8"?>
-<p:sldLayout xmlns:a16="http://schemas.microsoft.com/office/drawing/2014/main" xmlns:p14="http://schemas.microsoft.com/office/powerpoint/2010/main" xmlns:a="http://schemas.openxmlformats.org/drawingml/2006/main" xmlns:r="http://schemas.openxmlformats.org/officeDocument/2006/relationships" xmlns:p="http://schemas.openxmlformats.org/presentationml/2006/main" preserve="1" userDrawn="1">
+<p:sldLayout xmlns:a="http://schemas.openxmlformats.org/drawingml/2006/main" xmlns:r="http://schemas.openxmlformats.org/officeDocument/2006/relationships" xmlns:p="http://schemas.openxmlformats.org/presentationml/2006/main" preserve="1" userDrawn="1">
   <p:cSld name="Sub title">
     <p:spTree>
       <p:nvGrpSpPr>
@@ -884,7 +883,7 @@
 </file>
 
 <file path=ppt/slideLayouts/slideLayout3.xml><?xml version="1.0" encoding="utf-8"?>
-<p:sldLayout xmlns:a16="http://schemas.microsoft.com/office/drawing/2014/main" xmlns:p14="http://schemas.microsoft.com/office/powerpoint/2010/main" xmlns:a="http://schemas.openxmlformats.org/drawingml/2006/main" xmlns:r="http://schemas.openxmlformats.org/officeDocument/2006/relationships" xmlns:p="http://schemas.openxmlformats.org/presentationml/2006/main" preserve="1" userDrawn="1">
+<p:sldLayout xmlns:a="http://schemas.openxmlformats.org/drawingml/2006/main" xmlns:r="http://schemas.openxmlformats.org/officeDocument/2006/relationships" xmlns:p="http://schemas.openxmlformats.org/presentationml/2006/main" preserve="1" userDrawn="1">
   <p:cSld name="Overview">
     <p:spTree>
       <p:nvGrpSpPr>
@@ -1412,7 +1411,7 @@
 </file>
 
 <file path=ppt/slideLayouts/slideLayout4.xml><?xml version="1.0" encoding="utf-8"?>
-<p:sldLayout xmlns:a16="http://schemas.microsoft.com/office/drawing/2014/main" xmlns:p14="http://schemas.microsoft.com/office/powerpoint/2010/main" xmlns:a="http://schemas.openxmlformats.org/drawingml/2006/main" xmlns:r="http://schemas.openxmlformats.org/officeDocument/2006/relationships" xmlns:p="http://schemas.openxmlformats.org/presentationml/2006/main" type="obj" preserve="1">
+<p:sldLayout xmlns:a="http://schemas.openxmlformats.org/drawingml/2006/main" xmlns:r="http://schemas.openxmlformats.org/officeDocument/2006/relationships" xmlns:p="http://schemas.openxmlformats.org/presentationml/2006/main" type="obj" preserve="1">
   <p:cSld name="SingleChange">
     <p:spTree>
       <p:nvGrpSpPr>
@@ -2348,105 +2347,6 @@
 </p:sld>
 </file>
 
-<file path=ppt/slides/slide3.xml><?xml version="1.0" encoding="utf-8"?>
-<p:sld xmlns:p="http://schemas.openxmlformats.org/presentationml/2006/main">
-  <p:cSld>
-    <p:spTree>
-      <p:nvGrpSpPr>
-        <p:cNvPr id="1" name=""/>
-        <p:cNvGrpSpPr/>
-        <p:nvPr/>
-      </p:nvGrpSpPr>
-      <p:grpSpPr/>
-      <p:sp>
-        <p:nvSpPr>
-          <p:cNvPr id="2" name="Title"/>
-          <p:cNvSpPr>
-            <a:spLocks xmlns:a="http://schemas.openxmlformats.org/drawingml/2006/main" noGrp="1"/>
-          </p:cNvSpPr>
-          <p:nvPr>
-            <p:ph type="title"/>
-          </p:nvPr>
-        </p:nvSpPr>
-        <p:spPr/>
-        <p:txBody>
-          <a:bodyPr xmlns:a="http://schemas.openxmlformats.org/drawingml/2006/main"/>
-          <a:lstStyle xmlns:a="http://schemas.openxmlformats.org/drawingml/2006/main"/>
-          <a:p xmlns:a="http://schemas.openxmlformats.org/drawingml/2006/main">
-            <a:r>
-              <a:t>My new slide</a:t>
-            </a:r>
-          </a:p>
-        </p:txBody>
-      </p:sp>
-      <p:sp>
-        <p:nvSpPr>
-          <p:cNvPr id="3" name="Header1"/>
-          <p:cNvSpPr>
-            <a:spLocks xmlns:a="http://schemas.openxmlformats.org/drawingml/2006/main" noGrp="1"/>
-          </p:cNvSpPr>
-          <p:nvPr>
-            <p:ph idx="11"/>
-          </p:nvPr>
-        </p:nvSpPr>
-        <p:spPr/>
-        <p:txBody>
-          <a:bodyPr xmlns:a="http://schemas.openxmlformats.org/drawingml/2006/main"/>
-          <a:lstStyle xmlns:a="http://schemas.openxmlformats.org/drawingml/2006/main"/>
-          <a:p xmlns:a="http://schemas.openxmlformats.org/drawingml/2006/main">
-            <a:r>
-              <a:t>Überschrift1</a:t>
-            </a:r>
-          </a:p>
-        </p:txBody>
-      </p:sp>
-      <p:sp>
-        <p:nvSpPr>
-          <p:cNvPr id="4" name="Content1"/>
-          <p:cNvSpPr>
-            <a:spLocks xmlns:a="http://schemas.openxmlformats.org/drawingml/2006/main" noGrp="1"/>
-          </p:cNvSpPr>
-          <p:nvPr>
-            <p:ph idx="1"/>
-          </p:nvPr>
-        </p:nvSpPr>
-        <p:spPr/>
-        <p:txBody>
-          <a:bodyPr xmlns:a="http://schemas.openxmlformats.org/drawingml/2006/main"/>
-          <a:lstStyle xmlns:a="http://schemas.openxmlformats.org/drawingml/2006/main"/>
-          <a:p xmlns:a="http://schemas.openxmlformats.org/drawingml/2006/main">
-            <a:r>
-              <a:t>Text1</a:t>
-            </a:r>
-          </a:p>
-        </p:txBody>
-      </p:sp>
-      <p:sp>
-        <p:nvSpPr>
-          <p:cNvPr id="5" name="Content2"/>
-          <p:cNvSpPr>
-            <a:spLocks xmlns:a="http://schemas.openxmlformats.org/drawingml/2006/main" noGrp="1"/>
-          </p:cNvSpPr>
-          <p:nvPr>
-            <p:ph idx="10"/>
-          </p:nvPr>
-        </p:nvSpPr>
-        <p:spPr/>
-        <p:txBody>
-          <a:bodyPr xmlns:a="http://schemas.openxmlformats.org/drawingml/2006/main"/>
-          <a:lstStyle xmlns:a="http://schemas.openxmlformats.org/drawingml/2006/main"/>
-          <a:p xmlns:a="http://schemas.openxmlformats.org/drawingml/2006/main">
-            <a:r>
-              <a:t>Text2</a:t>
-            </a:r>
-          </a:p>
-        </p:txBody>
-      </p:sp>
-    </p:spTree>
-  </p:cSld>
-</p:sld>
-</file>
-
 <file path=ppt/theme/theme1.xml><?xml version="1.0" encoding="utf-8"?>
 <a:theme xmlns:a="http://schemas.openxmlformats.org/drawingml/2006/main" name="Office">
   <a:themeElements>

</xml_diff>